<commit_message>
Update Poster - Luisas Arbeitskopie, merge vermeiden.pptx
</commit_message>
<xml_diff>
--- a/Poster - Luisas Arbeitskopie, merge vermeiden.pptx
+++ b/Poster - Luisas Arbeitskopie, merge vermeiden.pptx
@@ -367,7 +367,7 @@
           <a:p>
             <a:fld id="{C3DFFD0B-8A86-49B4-B585-C3C192A21CEB}" type="slidenum">
               <a:rPr lang="de-DE" smtClean="0"/>
-              <a:t>‹#›</a:t>
+              <a:t>‹Nr.›</a:t>
             </a:fld>
             <a:endParaRPr lang="de-DE"/>
           </a:p>
@@ -757,7 +757,7 @@
           <a:p>
             <a:fld id="{A2ACB64B-D1A6-7D41-9BDE-3BC41FA5B95B}" type="slidenum">
               <a:rPr lang="en-US" smtClean="0"/>
-              <a:t>‹#›</a:t>
+              <a:t>‹Nr.›</a:t>
             </a:fld>
             <a:endParaRPr lang="en-US"/>
           </a:p>
@@ -927,7 +927,7 @@
           <a:p>
             <a:fld id="{A2ACB64B-D1A6-7D41-9BDE-3BC41FA5B95B}" type="slidenum">
               <a:rPr lang="en-US" smtClean="0"/>
-              <a:t>‹#›</a:t>
+              <a:t>‹Nr.›</a:t>
             </a:fld>
             <a:endParaRPr lang="en-US"/>
           </a:p>
@@ -1107,7 +1107,7 @@
           <a:p>
             <a:fld id="{A2ACB64B-D1A6-7D41-9BDE-3BC41FA5B95B}" type="slidenum">
               <a:rPr lang="en-US" smtClean="0"/>
-              <a:t>‹#›</a:t>
+              <a:t>‹Nr.›</a:t>
             </a:fld>
             <a:endParaRPr lang="en-US"/>
           </a:p>
@@ -1277,7 +1277,7 @@
           <a:p>
             <a:fld id="{A2ACB64B-D1A6-7D41-9BDE-3BC41FA5B95B}" type="slidenum">
               <a:rPr lang="en-US" smtClean="0"/>
-              <a:t>‹#›</a:t>
+              <a:t>‹Nr.›</a:t>
             </a:fld>
             <a:endParaRPr lang="en-US"/>
           </a:p>
@@ -1521,7 +1521,7 @@
           <a:p>
             <a:fld id="{A2ACB64B-D1A6-7D41-9BDE-3BC41FA5B95B}" type="slidenum">
               <a:rPr lang="en-US" smtClean="0"/>
-              <a:t>‹#›</a:t>
+              <a:t>‹Nr.›</a:t>
             </a:fld>
             <a:endParaRPr lang="en-US"/>
           </a:p>
@@ -1753,7 +1753,7 @@
           <a:p>
             <a:fld id="{A2ACB64B-D1A6-7D41-9BDE-3BC41FA5B95B}" type="slidenum">
               <a:rPr lang="en-US" smtClean="0"/>
-              <a:t>‹#›</a:t>
+              <a:t>‹Nr.›</a:t>
             </a:fld>
             <a:endParaRPr lang="en-US"/>
           </a:p>
@@ -2120,7 +2120,7 @@
           <a:p>
             <a:fld id="{A2ACB64B-D1A6-7D41-9BDE-3BC41FA5B95B}" type="slidenum">
               <a:rPr lang="en-US" smtClean="0"/>
-              <a:t>‹#›</a:t>
+              <a:t>‹Nr.›</a:t>
             </a:fld>
             <a:endParaRPr lang="en-US"/>
           </a:p>
@@ -2238,7 +2238,7 @@
           <a:p>
             <a:fld id="{A2ACB64B-D1A6-7D41-9BDE-3BC41FA5B95B}" type="slidenum">
               <a:rPr lang="en-US" smtClean="0"/>
-              <a:t>‹#›</a:t>
+              <a:t>‹Nr.›</a:t>
             </a:fld>
             <a:endParaRPr lang="en-US"/>
           </a:p>
@@ -2333,7 +2333,7 @@
           <a:p>
             <a:fld id="{A2ACB64B-D1A6-7D41-9BDE-3BC41FA5B95B}" type="slidenum">
               <a:rPr lang="en-US" smtClean="0"/>
-              <a:t>‹#›</a:t>
+              <a:t>‹Nr.›</a:t>
             </a:fld>
             <a:endParaRPr lang="en-US"/>
           </a:p>
@@ -2610,7 +2610,7 @@
           <a:p>
             <a:fld id="{A2ACB64B-D1A6-7D41-9BDE-3BC41FA5B95B}" type="slidenum">
               <a:rPr lang="en-US" smtClean="0"/>
-              <a:t>‹#›</a:t>
+              <a:t>‹Nr.›</a:t>
             </a:fld>
             <a:endParaRPr lang="en-US"/>
           </a:p>
@@ -2867,7 +2867,7 @@
           <a:p>
             <a:fld id="{A2ACB64B-D1A6-7D41-9BDE-3BC41FA5B95B}" type="slidenum">
               <a:rPr lang="en-US" smtClean="0"/>
-              <a:t>‹#›</a:t>
+              <a:t>‹Nr.›</a:t>
             </a:fld>
             <a:endParaRPr lang="en-US"/>
           </a:p>
@@ -3116,7 +3116,7 @@
           <a:p>
             <a:fld id="{A2ACB64B-D1A6-7D41-9BDE-3BC41FA5B95B}" type="slidenum">
               <a:rPr lang="en-US" smtClean="0"/>
-              <a:t>‹#›</a:t>
+              <a:t>‹Nr.›</a:t>
             </a:fld>
             <a:endParaRPr lang="en-US"/>
           </a:p>
@@ -4467,7 +4467,7 @@
           <a:p>
             <a:r>
               <a:rPr lang="en-GB" sz="6000" b="1" noProof="0" dirty="0"/>
-              <a:t>                  Our Approach</a:t>
+              <a:t>                  Our Approach and Results</a:t>
             </a:r>
             <a:endParaRPr lang="en-GB" sz="1500" b="1" noProof="0" dirty="0"/>
           </a:p>
@@ -5146,8 +5146,8 @@
         </p:nvGrpSpPr>
         <p:grpSpPr>
           <a:xfrm>
-            <a:off x="11999198" y="16210552"/>
-            <a:ext cx="17171804" cy="8336937"/>
+            <a:off x="13453847" y="16210552"/>
+            <a:ext cx="15717156" cy="7731488"/>
             <a:chOff x="11999198" y="16210552"/>
             <a:chExt cx="17171804" cy="8336937"/>
           </a:xfrm>
@@ -7248,7 +7248,7 @@
                   <a:srgbClr val="842332"/>
                 </a:solidFill>
               </a:rPr>
-              <a:t>&lt; 0,7</a:t>
+              <a:t>&lt; 0.7</a:t>
             </a:r>
           </a:p>
         </p:txBody>
@@ -7326,7 +7326,7 @@
                   <a:srgbClr val="191970"/>
                 </a:solidFill>
               </a:rPr>
-              <a:t>≥ 0,7</a:t>
+              <a:t>≥ 0.7</a:t>
             </a:r>
           </a:p>
         </p:txBody>
@@ -7928,6 +7928,1164 @@
           </a:fontRef>
         </p:style>
       </p:cxnSp>
+      <p:sp>
+        <p:nvSpPr>
+          <p:cNvPr id="2" name="Textfeld 1">
+            <a:extLst>
+              <a:ext uri="{FF2B5EF4-FFF2-40B4-BE49-F238E27FC236}">
+                <a16:creationId xmlns:a16="http://schemas.microsoft.com/office/drawing/2014/main" id="{002F6548-8D92-C755-018F-1E50DA196084}"/>
+              </a:ext>
+            </a:extLst>
+          </p:cNvPr>
+          <p:cNvSpPr txBox="1"/>
+          <p:nvPr/>
+        </p:nvSpPr>
+        <p:spPr>
+          <a:xfrm>
+            <a:off x="1429593" y="23666683"/>
+            <a:ext cx="9848007" cy="2862322"/>
+          </a:xfrm>
+          <a:prstGeom prst="rect">
+            <a:avLst/>
+          </a:prstGeom>
+          <a:noFill/>
+        </p:spPr>
+        <p:txBody>
+          <a:bodyPr wrap="square" rtlCol="0">
+            <a:spAutoFit/>
+          </a:bodyPr>
+          <a:lstStyle/>
+          <a:p>
+            <a:r>
+              <a:rPr lang="de-DE" sz="2000" b="1" dirty="0"/>
+              <a:t>Fig. 3 </a:t>
+            </a:r>
+            <a:r>
+              <a:rPr lang="de-DE" sz="2000" dirty="0" err="1"/>
+              <a:t>Selection</a:t>
+            </a:r>
+            <a:r>
+              <a:rPr lang="de-DE" sz="2000" dirty="0"/>
+              <a:t> </a:t>
+            </a:r>
+            <a:r>
+              <a:rPr lang="de-DE" sz="2000" dirty="0" err="1"/>
+              <a:t>criteria</a:t>
+            </a:r>
+            <a:r>
+              <a:rPr lang="de-DE" sz="2000" dirty="0"/>
+              <a:t> </a:t>
+            </a:r>
+            <a:r>
+              <a:rPr lang="de-DE" sz="2000" dirty="0" err="1"/>
+              <a:t>used</a:t>
+            </a:r>
+            <a:r>
+              <a:rPr lang="de-DE" sz="2000" dirty="0"/>
+              <a:t> </a:t>
+            </a:r>
+            <a:r>
+              <a:rPr lang="de-DE" sz="2000" dirty="0" err="1"/>
+              <a:t>for</a:t>
+            </a:r>
+            <a:r>
+              <a:rPr lang="de-DE" sz="2000" dirty="0"/>
+              <a:t> </a:t>
+            </a:r>
+            <a:r>
+              <a:rPr lang="de-DE" sz="2000" dirty="0" err="1"/>
+              <a:t>the</a:t>
+            </a:r>
+            <a:r>
+              <a:rPr lang="de-DE" sz="2000" dirty="0"/>
+              <a:t> </a:t>
+            </a:r>
+            <a:r>
+              <a:rPr lang="de-DE" sz="2000" dirty="0" err="1"/>
+              <a:t>identification</a:t>
+            </a:r>
+            <a:r>
+              <a:rPr lang="de-DE" sz="2000" dirty="0"/>
+              <a:t> </a:t>
+            </a:r>
+            <a:r>
+              <a:rPr lang="de-DE" sz="2000" dirty="0" err="1"/>
+              <a:t>of</a:t>
+            </a:r>
+            <a:r>
+              <a:rPr lang="de-DE" sz="2000" dirty="0"/>
+              <a:t> RNA-</a:t>
+            </a:r>
+            <a:r>
+              <a:rPr lang="de-DE" sz="2000" dirty="0" err="1"/>
+              <a:t>dependent</a:t>
+            </a:r>
+            <a:r>
+              <a:rPr lang="de-DE" sz="2000" dirty="0"/>
+              <a:t> (</a:t>
+            </a:r>
+            <a:r>
+              <a:rPr lang="de-DE" sz="2000" dirty="0" err="1"/>
+              <a:t>selected</a:t>
+            </a:r>
+            <a:r>
+              <a:rPr lang="de-DE" sz="2000" dirty="0"/>
+              <a:t>) and not RNA-</a:t>
+            </a:r>
+            <a:r>
+              <a:rPr lang="de-DE" sz="2000" dirty="0" err="1"/>
+              <a:t>dependent</a:t>
+            </a:r>
+            <a:r>
+              <a:rPr lang="de-DE" sz="2000" dirty="0"/>
+              <a:t> (not </a:t>
+            </a:r>
+            <a:r>
+              <a:rPr lang="de-DE" sz="2000" dirty="0" err="1"/>
+              <a:t>selected</a:t>
+            </a:r>
+            <a:r>
+              <a:rPr lang="de-DE" sz="2000" dirty="0"/>
+              <a:t>) </a:t>
+            </a:r>
+            <a:r>
+              <a:rPr lang="de-DE" sz="2000" dirty="0" err="1"/>
+              <a:t>proteins</a:t>
+            </a:r>
+            <a:r>
+              <a:rPr lang="de-DE" sz="2000" dirty="0"/>
+              <a:t> </a:t>
+            </a:r>
+          </a:p>
+          <a:p>
+            <a:endParaRPr lang="de-DE" sz="2000" dirty="0"/>
+          </a:p>
+          <a:p>
+            <a:r>
+              <a:rPr lang="de-DE" sz="2000" dirty="0"/>
+              <a:t>Proteins </a:t>
+            </a:r>
+            <a:r>
+              <a:rPr lang="de-DE" sz="2000" dirty="0" err="1"/>
+              <a:t>were</a:t>
+            </a:r>
+            <a:r>
+              <a:rPr lang="de-DE" sz="2000" dirty="0"/>
+              <a:t> </a:t>
+            </a:r>
+            <a:r>
+              <a:rPr lang="de-DE" sz="2000" dirty="0" err="1"/>
+              <a:t>selected</a:t>
+            </a:r>
+            <a:r>
+              <a:rPr lang="de-DE" sz="2000" dirty="0"/>
+              <a:t> </a:t>
+            </a:r>
+            <a:r>
+              <a:rPr lang="de-DE" sz="2000" dirty="0" err="1"/>
+              <a:t>based</a:t>
+            </a:r>
+            <a:r>
+              <a:rPr lang="de-DE" sz="2000" dirty="0"/>
+              <a:t> on a </a:t>
+            </a:r>
+            <a:r>
+              <a:rPr lang="de-DE" sz="2000" dirty="0" err="1"/>
+              <a:t>sequence</a:t>
+            </a:r>
+            <a:r>
+              <a:rPr lang="de-DE" sz="2000" dirty="0"/>
+              <a:t> </a:t>
+            </a:r>
+            <a:r>
+              <a:rPr lang="de-DE" sz="2000" dirty="0" err="1"/>
+              <a:t>ofcriteria</a:t>
+            </a:r>
+            <a:r>
+              <a:rPr lang="de-DE" sz="2000" dirty="0"/>
+              <a:t>. The </a:t>
+            </a:r>
+            <a:r>
+              <a:rPr lang="de-DE" sz="2000" dirty="0" err="1"/>
+              <a:t>selected</a:t>
+            </a:r>
+            <a:r>
+              <a:rPr lang="de-DE" sz="2000" dirty="0"/>
+              <a:t> </a:t>
+            </a:r>
+            <a:r>
+              <a:rPr lang="de-DE" sz="2000" dirty="0" err="1"/>
+              <a:t>proteins</a:t>
+            </a:r>
+            <a:r>
+              <a:rPr lang="de-DE" sz="2000" dirty="0"/>
+              <a:t> </a:t>
+            </a:r>
+            <a:r>
+              <a:rPr lang="de-DE" sz="2000" dirty="0" err="1"/>
+              <a:t>either</a:t>
+            </a:r>
+            <a:r>
+              <a:rPr lang="de-DE" sz="2000" dirty="0"/>
+              <a:t> </a:t>
+            </a:r>
+            <a:r>
+              <a:rPr lang="de-DE" sz="2000" dirty="0" err="1"/>
+              <a:t>had</a:t>
+            </a:r>
+            <a:r>
+              <a:rPr lang="de-DE" sz="2000" dirty="0"/>
+              <a:t> a </a:t>
+            </a:r>
+            <a:r>
+              <a:rPr lang="de-DE" sz="2000" dirty="0" err="1"/>
+              <a:t>center</a:t>
+            </a:r>
+            <a:r>
+              <a:rPr lang="de-DE" sz="2000" dirty="0"/>
+              <a:t> </a:t>
+            </a:r>
+            <a:r>
+              <a:rPr lang="de-DE" sz="2000" dirty="0" err="1"/>
+              <a:t>of</a:t>
+            </a:r>
+            <a:r>
+              <a:rPr lang="de-DE" sz="2000" dirty="0"/>
+              <a:t> </a:t>
+            </a:r>
+            <a:r>
+              <a:rPr lang="de-DE" sz="2000" dirty="0" err="1"/>
+              <a:t>mass</a:t>
+            </a:r>
+            <a:r>
+              <a:rPr lang="de-DE" sz="2000" dirty="0"/>
+              <a:t> shift ≥ 2 </a:t>
+            </a:r>
+            <a:r>
+              <a:rPr lang="de-DE" sz="2000" dirty="0" err="1"/>
+              <a:t>fractions</a:t>
+            </a:r>
+            <a:r>
+              <a:rPr lang="de-DE" sz="2000" dirty="0"/>
+              <a:t>, </a:t>
+            </a:r>
+            <a:r>
+              <a:rPr lang="de-DE" sz="2000" dirty="0" err="1"/>
+              <a:t>or</a:t>
+            </a:r>
+            <a:r>
+              <a:rPr lang="de-DE" sz="2000" dirty="0"/>
+              <a:t> </a:t>
+            </a:r>
+            <a:r>
+              <a:rPr lang="de-DE" sz="2000" dirty="0" err="1"/>
+              <a:t>had</a:t>
+            </a:r>
+            <a:r>
+              <a:rPr lang="de-DE" sz="2000" dirty="0"/>
+              <a:t> </a:t>
+            </a:r>
+            <a:r>
+              <a:rPr lang="de-DE" sz="2000" dirty="0" err="1"/>
+              <a:t>no</a:t>
+            </a:r>
+            <a:r>
+              <a:rPr lang="de-DE" sz="2000" dirty="0"/>
+              <a:t> </a:t>
+            </a:r>
+            <a:r>
+              <a:rPr lang="de-DE" sz="2000" dirty="0" err="1"/>
+              <a:t>center</a:t>
+            </a:r>
+            <a:r>
+              <a:rPr lang="de-DE" sz="2000" dirty="0"/>
+              <a:t> </a:t>
+            </a:r>
+            <a:r>
+              <a:rPr lang="de-DE" sz="2000" dirty="0" err="1"/>
+              <a:t>of</a:t>
+            </a:r>
+            <a:r>
+              <a:rPr lang="de-DE" sz="2000" dirty="0"/>
+              <a:t> </a:t>
+            </a:r>
+            <a:r>
+              <a:rPr lang="de-DE" sz="2000" dirty="0" err="1"/>
+              <a:t>mass</a:t>
+            </a:r>
+            <a:r>
+              <a:rPr lang="de-DE" sz="2000" dirty="0"/>
+              <a:t> shift, but </a:t>
+            </a:r>
+            <a:r>
+              <a:rPr lang="de-DE" sz="2000" dirty="0" err="1"/>
+              <a:t>had</a:t>
+            </a:r>
+            <a:r>
+              <a:rPr lang="de-DE" sz="2000" dirty="0"/>
+              <a:t> a </a:t>
+            </a:r>
+            <a:r>
+              <a:rPr lang="de-DE" sz="2000" dirty="0" err="1"/>
+              <a:t>main</a:t>
+            </a:r>
+            <a:r>
+              <a:rPr lang="de-DE" sz="2000" dirty="0"/>
+              <a:t> maximum shift ≥ 3 </a:t>
+            </a:r>
+            <a:r>
+              <a:rPr lang="de-DE" sz="2000" dirty="0" err="1"/>
+              <a:t>fractions</a:t>
+            </a:r>
+            <a:r>
+              <a:rPr lang="de-DE" sz="2000" dirty="0"/>
+              <a:t>, and </a:t>
+            </a:r>
+            <a:r>
+              <a:rPr lang="de-DE" sz="2000" dirty="0" err="1"/>
+              <a:t>additionally</a:t>
+            </a:r>
+            <a:r>
+              <a:rPr lang="de-DE" sz="2000" dirty="0"/>
+              <a:t> a </a:t>
+            </a:r>
+            <a:r>
+              <a:rPr lang="de-DE" sz="2000" dirty="0" err="1"/>
+              <a:t>correlation</a:t>
+            </a:r>
+            <a:r>
+              <a:rPr lang="de-DE" sz="2000" dirty="0"/>
+              <a:t> </a:t>
+            </a:r>
+            <a:r>
+              <a:rPr lang="de-DE" sz="2000" dirty="0" err="1"/>
+              <a:t>value</a:t>
+            </a:r>
+            <a:r>
+              <a:rPr lang="de-DE" sz="2000" dirty="0"/>
+              <a:t> </a:t>
+            </a:r>
+            <a:r>
+              <a:rPr lang="de-DE" sz="2000" dirty="0" err="1"/>
+              <a:t>of</a:t>
+            </a:r>
+            <a:r>
+              <a:rPr lang="de-DE" sz="2000" dirty="0"/>
+              <a:t> &lt; 0.7 </a:t>
+            </a:r>
+            <a:r>
+              <a:rPr lang="de-DE" sz="2000" dirty="0" err="1"/>
+              <a:t>between</a:t>
+            </a:r>
+            <a:r>
+              <a:rPr lang="de-DE" sz="2000" dirty="0"/>
+              <a:t> </a:t>
+            </a:r>
+            <a:r>
+              <a:rPr lang="de-DE" sz="2000" dirty="0" err="1"/>
+              <a:t>control</a:t>
+            </a:r>
+            <a:r>
+              <a:rPr lang="de-DE" sz="2000" dirty="0"/>
+              <a:t> and </a:t>
+            </a:r>
+            <a:r>
+              <a:rPr lang="de-DE" sz="2000" dirty="0" err="1"/>
+              <a:t>rnase</a:t>
+            </a:r>
+            <a:r>
+              <a:rPr lang="de-DE" sz="2000" dirty="0"/>
+              <a:t> .  The not </a:t>
+            </a:r>
+            <a:r>
+              <a:rPr lang="de-DE" sz="2000" dirty="0" err="1"/>
+              <a:t>selected</a:t>
+            </a:r>
+            <a:r>
+              <a:rPr lang="de-DE" sz="2000" dirty="0"/>
+              <a:t> </a:t>
+            </a:r>
+            <a:r>
+              <a:rPr lang="de-DE" sz="2000" dirty="0" err="1"/>
+              <a:t>proteins</a:t>
+            </a:r>
+            <a:r>
+              <a:rPr lang="de-DE" sz="2000" dirty="0"/>
+              <a:t> </a:t>
+            </a:r>
+            <a:r>
+              <a:rPr lang="de-DE" sz="2000" dirty="0" err="1"/>
+              <a:t>either</a:t>
+            </a:r>
+            <a:r>
+              <a:rPr lang="de-DE" sz="2000" dirty="0"/>
+              <a:t> </a:t>
+            </a:r>
+            <a:r>
+              <a:rPr lang="de-DE" sz="2000" dirty="0" err="1"/>
+              <a:t>had</a:t>
+            </a:r>
+            <a:r>
+              <a:rPr lang="de-DE" sz="2000" dirty="0"/>
+              <a:t> </a:t>
+            </a:r>
+            <a:r>
+              <a:rPr lang="de-DE" sz="2000" dirty="0" err="1"/>
+              <a:t>no</a:t>
+            </a:r>
+            <a:r>
+              <a:rPr lang="de-DE" sz="2000" dirty="0"/>
+              <a:t> </a:t>
+            </a:r>
+            <a:r>
+              <a:rPr lang="de-DE" sz="2000" dirty="0" err="1"/>
+              <a:t>center</a:t>
+            </a:r>
+            <a:r>
+              <a:rPr lang="de-DE" sz="2000" dirty="0"/>
+              <a:t> </a:t>
+            </a:r>
+            <a:r>
+              <a:rPr lang="de-DE" sz="2000" dirty="0" err="1"/>
+              <a:t>of</a:t>
+            </a:r>
+            <a:r>
+              <a:rPr lang="de-DE" sz="2000" dirty="0"/>
+              <a:t> </a:t>
+            </a:r>
+            <a:r>
+              <a:rPr lang="de-DE" sz="2000" dirty="0" err="1"/>
+              <a:t>mass</a:t>
+            </a:r>
+            <a:r>
+              <a:rPr lang="de-DE" sz="2000" dirty="0"/>
+              <a:t> shift ≥ 2 </a:t>
+            </a:r>
+            <a:r>
+              <a:rPr lang="de-DE" sz="2000" dirty="0" err="1"/>
+              <a:t>fractions</a:t>
+            </a:r>
+            <a:r>
+              <a:rPr lang="de-DE" sz="2000" dirty="0"/>
+              <a:t> and </a:t>
+            </a:r>
+            <a:r>
+              <a:rPr lang="de-DE" sz="2000" dirty="0" err="1"/>
+              <a:t>no</a:t>
+            </a:r>
+            <a:r>
+              <a:rPr lang="de-DE" sz="2000" dirty="0"/>
+              <a:t> </a:t>
+            </a:r>
+            <a:r>
+              <a:rPr lang="de-DE" sz="2000" dirty="0" err="1"/>
+              <a:t>main</a:t>
+            </a:r>
+            <a:r>
+              <a:rPr lang="de-DE" sz="2000" dirty="0"/>
+              <a:t> maximum shift </a:t>
+            </a:r>
+            <a:r>
+              <a:rPr lang="de-DE" sz="2000" dirty="0">
+                <a:solidFill>
+                  <a:srgbClr val="191970"/>
+                </a:solidFill>
+              </a:rPr>
+              <a:t>≥ 3</a:t>
+            </a:r>
+            <a:r>
+              <a:rPr lang="de-DE" sz="2000" dirty="0"/>
+              <a:t> </a:t>
+            </a:r>
+            <a:r>
+              <a:rPr lang="de-DE" sz="2000" dirty="0" err="1"/>
+              <a:t>fractions</a:t>
+            </a:r>
+            <a:r>
+              <a:rPr lang="de-DE" sz="2000" dirty="0"/>
+              <a:t>, </a:t>
+            </a:r>
+            <a:r>
+              <a:rPr lang="de-DE" sz="2000" dirty="0" err="1"/>
+              <a:t>or</a:t>
+            </a:r>
+            <a:r>
+              <a:rPr lang="de-DE" sz="2000" dirty="0"/>
+              <a:t> </a:t>
+            </a:r>
+            <a:r>
+              <a:rPr lang="de-DE" sz="2000" dirty="0" err="1"/>
+              <a:t>had</a:t>
+            </a:r>
+            <a:r>
+              <a:rPr lang="de-DE" sz="2000" dirty="0"/>
+              <a:t> </a:t>
+            </a:r>
+            <a:r>
+              <a:rPr lang="de-DE" sz="2000" dirty="0" err="1"/>
+              <a:t>no</a:t>
+            </a:r>
+            <a:r>
+              <a:rPr lang="de-DE" sz="2000" dirty="0"/>
+              <a:t> </a:t>
+            </a:r>
+            <a:r>
+              <a:rPr lang="de-DE" sz="2000" dirty="0" err="1"/>
+              <a:t>center</a:t>
+            </a:r>
+            <a:r>
+              <a:rPr lang="de-DE" sz="2000" dirty="0"/>
+              <a:t> </a:t>
+            </a:r>
+            <a:r>
+              <a:rPr lang="de-DE" sz="2000" dirty="0" err="1"/>
+              <a:t>of</a:t>
+            </a:r>
+            <a:r>
+              <a:rPr lang="de-DE" sz="2000" dirty="0"/>
+              <a:t> </a:t>
+            </a:r>
+            <a:r>
+              <a:rPr lang="de-DE" sz="2000" dirty="0" err="1"/>
+              <a:t>mass</a:t>
+            </a:r>
+            <a:r>
+              <a:rPr lang="de-DE" sz="2000" dirty="0"/>
+              <a:t> shift, but a </a:t>
+            </a:r>
+            <a:r>
+              <a:rPr lang="de-DE" sz="2000" dirty="0" err="1"/>
+              <a:t>main</a:t>
+            </a:r>
+            <a:r>
+              <a:rPr lang="de-DE" sz="2000" dirty="0"/>
+              <a:t> maximum shift and </a:t>
+            </a:r>
+            <a:r>
+              <a:rPr lang="de-DE" sz="2000" dirty="0" err="1"/>
+              <a:t>additionally</a:t>
+            </a:r>
+            <a:r>
+              <a:rPr lang="de-DE" sz="2000" dirty="0"/>
+              <a:t> a </a:t>
+            </a:r>
+            <a:r>
+              <a:rPr lang="de-DE" sz="2000" dirty="0" err="1"/>
+              <a:t>correlaction</a:t>
+            </a:r>
+            <a:r>
+              <a:rPr lang="de-DE" sz="2000" dirty="0"/>
+              <a:t> </a:t>
+            </a:r>
+            <a:r>
+              <a:rPr lang="de-DE" sz="2000" dirty="0" err="1"/>
+              <a:t>value</a:t>
+            </a:r>
+            <a:r>
+              <a:rPr lang="de-DE" sz="2000" dirty="0"/>
+              <a:t> ≥ 0.7 </a:t>
+            </a:r>
+            <a:r>
+              <a:rPr lang="de-DE" sz="2000" dirty="0" err="1"/>
+              <a:t>between</a:t>
+            </a:r>
+            <a:r>
+              <a:rPr lang="de-DE" sz="2000" dirty="0"/>
+              <a:t> </a:t>
+            </a:r>
+            <a:r>
+              <a:rPr lang="de-DE" sz="2000" dirty="0" err="1"/>
+              <a:t>contro</a:t>
+            </a:r>
+            <a:r>
+              <a:rPr lang="de-DE" sz="2000" dirty="0"/>
+              <a:t>, and </a:t>
+            </a:r>
+            <a:r>
+              <a:rPr lang="de-DE" sz="2000" dirty="0" err="1"/>
+              <a:t>rnase</a:t>
+            </a:r>
+            <a:r>
+              <a:rPr lang="de-DE" sz="2000" dirty="0"/>
+              <a:t>. </a:t>
+            </a:r>
+          </a:p>
+        </p:txBody>
+      </p:sp>
+      <p:pic>
+        <p:nvPicPr>
+          <p:cNvPr id="5" name="Grafik 4">
+            <a:extLst>
+              <a:ext uri="{FF2B5EF4-FFF2-40B4-BE49-F238E27FC236}">
+                <a16:creationId xmlns:a16="http://schemas.microsoft.com/office/drawing/2014/main" id="{989D5533-9B2F-5E4F-BFF9-FDA622B3EFD6}"/>
+              </a:ext>
+            </a:extLst>
+          </p:cNvPr>
+          <p:cNvPicPr>
+            <a:picLocks noChangeAspect="1"/>
+          </p:cNvPicPr>
+          <p:nvPr/>
+        </p:nvPicPr>
+        <p:blipFill>
+          <a:blip r:embed="rId25"/>
+          <a:stretch>
+            <a:fillRect/>
+          </a:stretch>
+        </p:blipFill>
+        <p:spPr>
+          <a:xfrm>
+            <a:off x="14941610" y="21402919"/>
+            <a:ext cx="8608993" cy="4143581"/>
+          </a:xfrm>
+          <a:prstGeom prst="rect">
+            <a:avLst/>
+          </a:prstGeom>
+        </p:spPr>
+      </p:pic>
+      <p:sp>
+        <p:nvSpPr>
+          <p:cNvPr id="16" name="Textfeld 15">
+            <a:extLst>
+              <a:ext uri="{FF2B5EF4-FFF2-40B4-BE49-F238E27FC236}">
+                <a16:creationId xmlns:a16="http://schemas.microsoft.com/office/drawing/2014/main" id="{447642A8-D5C5-97E6-FC45-3440DC69F80C}"/>
+              </a:ext>
+            </a:extLst>
+          </p:cNvPr>
+          <p:cNvSpPr txBox="1"/>
+          <p:nvPr/>
+        </p:nvSpPr>
+        <p:spPr>
+          <a:xfrm>
+            <a:off x="13186252" y="24830961"/>
+            <a:ext cx="11094443" cy="1754326"/>
+          </a:xfrm>
+          <a:prstGeom prst="rect">
+            <a:avLst/>
+          </a:prstGeom>
+          <a:noFill/>
+        </p:spPr>
+        <p:txBody>
+          <a:bodyPr wrap="square" rtlCol="0">
+            <a:spAutoFit/>
+          </a:bodyPr>
+          <a:lstStyle/>
+          <a:p>
+            <a:r>
+              <a:rPr lang="de-DE" b="1" dirty="0"/>
+              <a:t>Fig 4 </a:t>
+            </a:r>
+            <a:r>
+              <a:rPr lang="de-DE" dirty="0" err="1"/>
+              <a:t>Scatter</a:t>
+            </a:r>
+            <a:r>
+              <a:rPr lang="de-DE" dirty="0"/>
+              <a:t> Plots </a:t>
+            </a:r>
+            <a:r>
+              <a:rPr lang="de-DE" dirty="0" err="1"/>
+              <a:t>of</a:t>
+            </a:r>
+            <a:r>
+              <a:rPr lang="de-DE" dirty="0"/>
+              <a:t> </a:t>
+            </a:r>
+            <a:r>
+              <a:rPr lang="de-DE" dirty="0" err="1"/>
+              <a:t>the</a:t>
+            </a:r>
+            <a:r>
+              <a:rPr lang="de-DE" dirty="0"/>
+              <a:t> </a:t>
+            </a:r>
+            <a:r>
+              <a:rPr lang="de-DE" dirty="0" err="1"/>
+              <a:t>center</a:t>
+            </a:r>
+            <a:r>
+              <a:rPr lang="de-DE" dirty="0"/>
+              <a:t> </a:t>
+            </a:r>
+            <a:r>
+              <a:rPr lang="de-DE" dirty="0" err="1"/>
+              <a:t>of</a:t>
+            </a:r>
+            <a:r>
+              <a:rPr lang="de-DE" dirty="0"/>
+              <a:t> </a:t>
+            </a:r>
+            <a:r>
+              <a:rPr lang="de-DE" dirty="0" err="1"/>
+              <a:t>mass</a:t>
+            </a:r>
+            <a:r>
+              <a:rPr lang="de-DE" dirty="0"/>
+              <a:t> </a:t>
+            </a:r>
+            <a:r>
+              <a:rPr lang="de-DE" dirty="0" err="1"/>
+              <a:t>values</a:t>
+            </a:r>
+            <a:r>
+              <a:rPr lang="de-DE" dirty="0"/>
+              <a:t> </a:t>
+            </a:r>
+            <a:r>
+              <a:rPr lang="de-DE" dirty="0" err="1"/>
+              <a:t>between</a:t>
+            </a:r>
+            <a:r>
+              <a:rPr lang="de-DE" dirty="0"/>
+              <a:t> </a:t>
+            </a:r>
+            <a:r>
+              <a:rPr lang="de-DE" dirty="0" err="1"/>
+              <a:t>control</a:t>
+            </a:r>
+            <a:r>
+              <a:rPr lang="de-DE" dirty="0"/>
+              <a:t> and </a:t>
+            </a:r>
+            <a:r>
+              <a:rPr lang="de-DE" dirty="0" err="1"/>
+              <a:t>rnase</a:t>
+            </a:r>
+            <a:r>
+              <a:rPr lang="de-DE" dirty="0"/>
+              <a:t> </a:t>
+            </a:r>
+          </a:p>
+          <a:p>
+            <a:endParaRPr lang="de-DE" dirty="0"/>
+          </a:p>
+          <a:p>
+            <a:r>
+              <a:rPr lang="de-DE" dirty="0" err="1"/>
+              <a:t>Each</a:t>
+            </a:r>
+            <a:r>
+              <a:rPr lang="de-DE" dirty="0"/>
+              <a:t> </a:t>
+            </a:r>
+            <a:r>
+              <a:rPr lang="de-DE" dirty="0" err="1"/>
+              <a:t>dot</a:t>
+            </a:r>
+            <a:r>
+              <a:rPr lang="de-DE" dirty="0"/>
+              <a:t> </a:t>
+            </a:r>
+            <a:r>
+              <a:rPr lang="de-DE" dirty="0" err="1"/>
+              <a:t>represents</a:t>
+            </a:r>
+            <a:r>
+              <a:rPr lang="de-DE" dirty="0"/>
+              <a:t> a </a:t>
+            </a:r>
+            <a:r>
+              <a:rPr lang="de-DE" dirty="0" err="1"/>
+              <a:t>protein</a:t>
+            </a:r>
+            <a:r>
+              <a:rPr lang="de-DE" dirty="0"/>
+              <a:t>. </a:t>
+            </a:r>
+            <a:r>
+              <a:rPr lang="de-DE" b="1" dirty="0"/>
+              <a:t>A) </a:t>
+            </a:r>
+            <a:r>
+              <a:rPr lang="de-DE" dirty="0" err="1"/>
+              <a:t>Scatter</a:t>
+            </a:r>
+            <a:r>
+              <a:rPr lang="de-DE" dirty="0"/>
+              <a:t> </a:t>
+            </a:r>
+            <a:r>
+              <a:rPr lang="de-DE" dirty="0" err="1"/>
+              <a:t>plot</a:t>
+            </a:r>
+            <a:r>
+              <a:rPr lang="de-DE" dirty="0"/>
+              <a:t> </a:t>
+            </a:r>
+            <a:r>
+              <a:rPr lang="de-DE" dirty="0" err="1"/>
+              <a:t>for</a:t>
+            </a:r>
+            <a:r>
+              <a:rPr lang="de-DE" dirty="0"/>
+              <a:t> </a:t>
+            </a:r>
+            <a:r>
+              <a:rPr lang="de-DE" dirty="0" err="1"/>
+              <a:t>the</a:t>
+            </a:r>
+            <a:r>
+              <a:rPr lang="de-DE" dirty="0"/>
+              <a:t> </a:t>
+            </a:r>
+            <a:r>
+              <a:rPr lang="de-DE" dirty="0" err="1"/>
+              <a:t>selected</a:t>
+            </a:r>
+            <a:r>
+              <a:rPr lang="de-DE" dirty="0"/>
+              <a:t> </a:t>
+            </a:r>
+            <a:r>
+              <a:rPr lang="de-DE" dirty="0" err="1"/>
+              <a:t>proteins</a:t>
+            </a:r>
+            <a:r>
+              <a:rPr lang="de-DE" dirty="0"/>
+              <a:t>. The COM </a:t>
+            </a:r>
+            <a:r>
+              <a:rPr lang="de-DE" dirty="0" err="1"/>
+              <a:t>values</a:t>
+            </a:r>
+            <a:r>
+              <a:rPr lang="de-DE" dirty="0"/>
+              <a:t> </a:t>
+            </a:r>
+            <a:r>
+              <a:rPr lang="de-DE" dirty="0" err="1"/>
+              <a:t>for</a:t>
+            </a:r>
+            <a:r>
+              <a:rPr lang="de-DE" dirty="0"/>
+              <a:t> </a:t>
+            </a:r>
+            <a:r>
+              <a:rPr lang="de-DE" dirty="0" err="1"/>
+              <a:t>the</a:t>
+            </a:r>
+            <a:r>
+              <a:rPr lang="de-DE" dirty="0"/>
+              <a:t> </a:t>
+            </a:r>
+            <a:r>
+              <a:rPr lang="de-DE" dirty="0" err="1"/>
+              <a:t>protein</a:t>
+            </a:r>
+            <a:r>
+              <a:rPr lang="de-DE" dirty="0"/>
+              <a:t> in </a:t>
+            </a:r>
+            <a:r>
+              <a:rPr lang="de-DE" dirty="0" err="1"/>
+              <a:t>the</a:t>
+            </a:r>
+            <a:r>
+              <a:rPr lang="de-DE" dirty="0"/>
+              <a:t> </a:t>
+            </a:r>
+            <a:r>
+              <a:rPr lang="de-DE" dirty="0" err="1"/>
+              <a:t>control</a:t>
+            </a:r>
+            <a:r>
+              <a:rPr lang="de-DE" dirty="0"/>
+              <a:t> </a:t>
+            </a:r>
+            <a:r>
+              <a:rPr lang="de-DE" dirty="0" err="1"/>
+              <a:t>approach</a:t>
+            </a:r>
+            <a:r>
+              <a:rPr lang="de-DE" dirty="0"/>
+              <a:t> </a:t>
+            </a:r>
+            <a:r>
+              <a:rPr lang="de-DE" dirty="0" err="1"/>
+              <a:t>are</a:t>
+            </a:r>
+            <a:r>
+              <a:rPr lang="de-DE" dirty="0"/>
+              <a:t> on </a:t>
+            </a:r>
+            <a:r>
+              <a:rPr lang="de-DE" dirty="0" err="1"/>
+              <a:t>the</a:t>
+            </a:r>
+            <a:r>
+              <a:rPr lang="de-DE" dirty="0"/>
+              <a:t> x-</a:t>
+            </a:r>
+            <a:r>
+              <a:rPr lang="de-DE" dirty="0" err="1"/>
+              <a:t>axis</a:t>
+            </a:r>
+            <a:r>
+              <a:rPr lang="de-DE" dirty="0"/>
+              <a:t>, </a:t>
+            </a:r>
+            <a:r>
+              <a:rPr lang="de-DE" dirty="0" err="1"/>
+              <a:t>those</a:t>
+            </a:r>
+            <a:r>
+              <a:rPr lang="de-DE" dirty="0"/>
+              <a:t> </a:t>
+            </a:r>
+            <a:r>
+              <a:rPr lang="de-DE" dirty="0" err="1"/>
+              <a:t>for</a:t>
+            </a:r>
+            <a:r>
+              <a:rPr lang="de-DE" dirty="0"/>
+              <a:t> </a:t>
+            </a:r>
+            <a:r>
+              <a:rPr lang="de-DE" dirty="0" err="1"/>
+              <a:t>the</a:t>
+            </a:r>
+            <a:r>
+              <a:rPr lang="de-DE" dirty="0"/>
+              <a:t> </a:t>
+            </a:r>
+            <a:r>
+              <a:rPr lang="de-DE" dirty="0" err="1"/>
+              <a:t>rnase</a:t>
+            </a:r>
+            <a:r>
+              <a:rPr lang="de-DE" dirty="0"/>
+              <a:t> </a:t>
+            </a:r>
+            <a:r>
+              <a:rPr lang="de-DE" dirty="0" err="1"/>
+              <a:t>approach</a:t>
+            </a:r>
+            <a:r>
+              <a:rPr lang="de-DE" dirty="0"/>
+              <a:t> </a:t>
+            </a:r>
+            <a:r>
+              <a:rPr lang="de-DE" dirty="0" err="1"/>
+              <a:t>are</a:t>
+            </a:r>
+            <a:r>
+              <a:rPr lang="de-DE" dirty="0"/>
+              <a:t> on </a:t>
+            </a:r>
+            <a:r>
+              <a:rPr lang="de-DE" dirty="0" err="1"/>
+              <a:t>the</a:t>
+            </a:r>
+            <a:r>
+              <a:rPr lang="de-DE" dirty="0"/>
+              <a:t> y-</a:t>
+            </a:r>
+            <a:r>
+              <a:rPr lang="de-DE" dirty="0" err="1"/>
+              <a:t>axis</a:t>
+            </a:r>
+            <a:r>
+              <a:rPr lang="de-DE" dirty="0"/>
+              <a:t>. </a:t>
+            </a:r>
+            <a:r>
+              <a:rPr lang="de-DE" b="1" dirty="0"/>
+              <a:t>B) </a:t>
+            </a:r>
+            <a:r>
+              <a:rPr lang="de-DE" dirty="0" err="1"/>
+              <a:t>Scatter</a:t>
+            </a:r>
+            <a:r>
+              <a:rPr lang="de-DE" dirty="0"/>
+              <a:t> </a:t>
+            </a:r>
+            <a:r>
+              <a:rPr lang="de-DE" dirty="0" err="1"/>
+              <a:t>plot</a:t>
+            </a:r>
+            <a:r>
+              <a:rPr lang="de-DE" dirty="0"/>
+              <a:t> </a:t>
+            </a:r>
+            <a:r>
+              <a:rPr lang="de-DE" dirty="0" err="1"/>
+              <a:t>for</a:t>
+            </a:r>
+            <a:r>
+              <a:rPr lang="de-DE" dirty="0"/>
+              <a:t> </a:t>
+            </a:r>
+            <a:r>
+              <a:rPr lang="de-DE" dirty="0" err="1"/>
+              <a:t>the</a:t>
+            </a:r>
+            <a:r>
+              <a:rPr lang="de-DE" dirty="0"/>
+              <a:t> not </a:t>
+            </a:r>
+            <a:r>
+              <a:rPr lang="de-DE" dirty="0" err="1"/>
+              <a:t>selected</a:t>
+            </a:r>
+            <a:r>
+              <a:rPr lang="de-DE" dirty="0"/>
+              <a:t> </a:t>
+            </a:r>
+            <a:r>
+              <a:rPr lang="de-DE" dirty="0" err="1"/>
+              <a:t>proteins</a:t>
+            </a:r>
+            <a:r>
+              <a:rPr lang="de-DE" dirty="0"/>
+              <a:t>. The COM </a:t>
+            </a:r>
+            <a:r>
+              <a:rPr lang="de-DE" dirty="0" err="1"/>
+              <a:t>values</a:t>
+            </a:r>
+            <a:r>
+              <a:rPr lang="de-DE" dirty="0"/>
+              <a:t> </a:t>
+            </a:r>
+            <a:r>
+              <a:rPr lang="de-DE" dirty="0" err="1"/>
+              <a:t>for</a:t>
+            </a:r>
+            <a:r>
+              <a:rPr lang="de-DE" dirty="0"/>
+              <a:t> </a:t>
+            </a:r>
+            <a:r>
+              <a:rPr lang="de-DE" dirty="0" err="1"/>
+              <a:t>the</a:t>
+            </a:r>
+            <a:r>
+              <a:rPr lang="de-DE" dirty="0"/>
+              <a:t> </a:t>
+            </a:r>
+            <a:r>
+              <a:rPr lang="de-DE" dirty="0" err="1"/>
+              <a:t>protein</a:t>
+            </a:r>
+            <a:r>
+              <a:rPr lang="de-DE" dirty="0"/>
+              <a:t> in </a:t>
+            </a:r>
+            <a:r>
+              <a:rPr lang="de-DE" dirty="0" err="1"/>
+              <a:t>the</a:t>
+            </a:r>
+            <a:r>
+              <a:rPr lang="de-DE" dirty="0"/>
+              <a:t> </a:t>
+            </a:r>
+            <a:r>
+              <a:rPr lang="de-DE" dirty="0" err="1"/>
+              <a:t>control</a:t>
+            </a:r>
+            <a:r>
+              <a:rPr lang="de-DE" dirty="0"/>
+              <a:t> </a:t>
+            </a:r>
+            <a:r>
+              <a:rPr lang="de-DE" dirty="0" err="1"/>
+              <a:t>approach</a:t>
+            </a:r>
+            <a:r>
+              <a:rPr lang="de-DE" dirty="0"/>
+              <a:t> </a:t>
+            </a:r>
+            <a:r>
+              <a:rPr lang="de-DE" dirty="0" err="1"/>
+              <a:t>are</a:t>
+            </a:r>
+            <a:r>
+              <a:rPr lang="de-DE" dirty="0"/>
+              <a:t> on </a:t>
+            </a:r>
+            <a:r>
+              <a:rPr lang="de-DE" dirty="0" err="1"/>
+              <a:t>the</a:t>
+            </a:r>
+            <a:r>
+              <a:rPr lang="de-DE" dirty="0"/>
+              <a:t> x-</a:t>
+            </a:r>
+            <a:r>
+              <a:rPr lang="de-DE" dirty="0" err="1"/>
+              <a:t>axis</a:t>
+            </a:r>
+            <a:r>
+              <a:rPr lang="de-DE" dirty="0"/>
+              <a:t>, </a:t>
+            </a:r>
+            <a:r>
+              <a:rPr lang="de-DE" dirty="0" err="1"/>
+              <a:t>those</a:t>
+            </a:r>
+            <a:r>
+              <a:rPr lang="de-DE" dirty="0"/>
+              <a:t> </a:t>
+            </a:r>
+            <a:r>
+              <a:rPr lang="de-DE" dirty="0" err="1"/>
+              <a:t>for</a:t>
+            </a:r>
+            <a:r>
+              <a:rPr lang="de-DE" dirty="0"/>
+              <a:t> </a:t>
+            </a:r>
+            <a:r>
+              <a:rPr lang="de-DE" dirty="0" err="1"/>
+              <a:t>the</a:t>
+            </a:r>
+            <a:r>
+              <a:rPr lang="de-DE" dirty="0"/>
+              <a:t> </a:t>
+            </a:r>
+            <a:r>
+              <a:rPr lang="de-DE" dirty="0" err="1"/>
+              <a:t>rnase</a:t>
+            </a:r>
+            <a:r>
+              <a:rPr lang="de-DE" dirty="0"/>
+              <a:t> </a:t>
+            </a:r>
+            <a:r>
+              <a:rPr lang="de-DE" dirty="0" err="1"/>
+              <a:t>approach</a:t>
+            </a:r>
+            <a:r>
+              <a:rPr lang="de-DE" dirty="0"/>
+              <a:t> </a:t>
+            </a:r>
+            <a:r>
+              <a:rPr lang="de-DE" dirty="0" err="1"/>
+              <a:t>are</a:t>
+            </a:r>
+            <a:r>
+              <a:rPr lang="de-DE" dirty="0"/>
+              <a:t> on </a:t>
+            </a:r>
+            <a:r>
+              <a:rPr lang="de-DE" dirty="0" err="1"/>
+              <a:t>the</a:t>
+            </a:r>
+            <a:r>
+              <a:rPr lang="de-DE" dirty="0"/>
+              <a:t> y-</a:t>
+            </a:r>
+            <a:r>
+              <a:rPr lang="de-DE" dirty="0" err="1"/>
+              <a:t>axis</a:t>
+            </a:r>
+            <a:r>
+              <a:rPr lang="de-DE" dirty="0"/>
+              <a:t>. </a:t>
+            </a:r>
+          </a:p>
+        </p:txBody>
+      </p:sp>
     </p:spTree>
     <p:extLst>
       <p:ext uri="{BB962C8B-B14F-4D97-AF65-F5344CB8AC3E}">

</xml_diff>